<commit_message>
Add chain id to BDL chain instructions
</commit_message>
<xml_diff>
--- a/How_to_connect_to_university_of_edinburgh_private_blockchain.pptx
+++ b/How_to_connect_to_university_of_edinburgh_private_blockchain.pptx
@@ -4180,7 +4180,7 @@
         <p:spPr>
           <a:xfrm>
             <a:off x="650160" y="2282040"/>
-            <a:ext cx="11703600" cy="5656320"/>
+            <a:ext cx="11703240" cy="5655960"/>
           </a:xfrm>
           <a:prstGeom prst="rect">
             <a:avLst/>
@@ -4191,7 +4191,7 @@
             <a:normAutofit/>
           </a:bodyPr>
           <a:p>
-            <a:pPr marL="432000" indent="-324000">
+            <a:pPr marL="432000" indent="-324000" algn="ctr">
               <a:spcBef>
                 <a:spcPts val="1417"/>
               </a:spcBef>
@@ -4203,17 +4203,17 @@
               <a:buChar char=""/>
             </a:pPr>
             <a:r>
-              <a:rPr b="0" lang="en-US" sz="3200" spc="-1" strike="noStrike">
+              <a:rPr b="0" lang="en-US" sz="1800" spc="-1" strike="noStrike">
                 <a:latin typeface="Arial"/>
               </a:rPr>
               <a:t>Click to edit the outline text format</a:t>
             </a:r>
-            <a:endParaRPr b="0" lang="en-US" sz="3200" spc="-1" strike="noStrike">
-              <a:latin typeface="Arial"/>
-            </a:endParaRPr>
-          </a:p>
-          <a:p>
-            <a:pPr lvl="1" marL="864000" indent="-324000">
+            <a:endParaRPr b="0" lang="en-US" sz="1800" spc="-1" strike="noStrike">
+              <a:latin typeface="Arial"/>
+            </a:endParaRPr>
+          </a:p>
+          <a:p>
+            <a:pPr lvl="1" marL="864000" indent="-324000" algn="ctr">
               <a:spcBef>
                 <a:spcPts val="1134"/>
               </a:spcBef>
@@ -4225,17 +4225,17 @@
               <a:buChar char=""/>
             </a:pPr>
             <a:r>
-              <a:rPr b="0" lang="en-US" sz="2800" spc="-1" strike="noStrike">
+              <a:rPr b="0" lang="en-US" sz="1800" spc="-1" strike="noStrike">
                 <a:latin typeface="Arial"/>
               </a:rPr>
               <a:t>Second Outline Level</a:t>
             </a:r>
-            <a:endParaRPr b="0" lang="en-US" sz="2800" spc="-1" strike="noStrike">
-              <a:latin typeface="Arial"/>
-            </a:endParaRPr>
-          </a:p>
-          <a:p>
-            <a:pPr lvl="2" marL="1296000" indent="-288000">
+            <a:endParaRPr b="0" lang="en-US" sz="1800" spc="-1" strike="noStrike">
+              <a:latin typeface="Arial"/>
+            </a:endParaRPr>
+          </a:p>
+          <a:p>
+            <a:pPr lvl="2" marL="1296000" indent="-288000" algn="ctr">
               <a:spcBef>
                 <a:spcPts val="850"/>
               </a:spcBef>
@@ -4247,17 +4247,17 @@
               <a:buChar char=""/>
             </a:pPr>
             <a:r>
-              <a:rPr b="0" lang="en-US" sz="2400" spc="-1" strike="noStrike">
+              <a:rPr b="0" lang="en-US" sz="1800" spc="-1" strike="noStrike">
                 <a:latin typeface="Arial"/>
               </a:rPr>
               <a:t>Third Outline Level</a:t>
             </a:r>
-            <a:endParaRPr b="0" lang="en-US" sz="2400" spc="-1" strike="noStrike">
-              <a:latin typeface="Arial"/>
-            </a:endParaRPr>
-          </a:p>
-          <a:p>
-            <a:pPr lvl="3" marL="1728000" indent="-216000">
+            <a:endParaRPr b="0" lang="en-US" sz="1800" spc="-1" strike="noStrike">
+              <a:latin typeface="Arial"/>
+            </a:endParaRPr>
+          </a:p>
+          <a:p>
+            <a:pPr lvl="3" marL="1728000" indent="-216000" algn="ctr">
               <a:spcBef>
                 <a:spcPts val="567"/>
               </a:spcBef>
@@ -4269,17 +4269,17 @@
               <a:buChar char=""/>
             </a:pPr>
             <a:r>
-              <a:rPr b="0" lang="en-US" sz="2000" spc="-1" strike="noStrike">
+              <a:rPr b="0" lang="en-US" sz="1800" spc="-1" strike="noStrike">
                 <a:latin typeface="Arial"/>
               </a:rPr>
               <a:t>Fourth Outline Level</a:t>
             </a:r>
-            <a:endParaRPr b="0" lang="en-US" sz="2000" spc="-1" strike="noStrike">
-              <a:latin typeface="Arial"/>
-            </a:endParaRPr>
-          </a:p>
-          <a:p>
-            <a:pPr lvl="4" marL="2160000" indent="-216000">
+            <a:endParaRPr b="0" lang="en-US" sz="1800" spc="-1" strike="noStrike">
+              <a:latin typeface="Arial"/>
+            </a:endParaRPr>
+          </a:p>
+          <a:p>
+            <a:pPr lvl="4" marL="2160000" indent="-216000" algn="ctr">
               <a:spcBef>
                 <a:spcPts val="283"/>
               </a:spcBef>
@@ -4291,17 +4291,17 @@
               <a:buChar char=""/>
             </a:pPr>
             <a:r>
-              <a:rPr b="0" lang="en-US" sz="2000" spc="-1" strike="noStrike">
+              <a:rPr b="0" lang="en-US" sz="1800" spc="-1" strike="noStrike">
                 <a:latin typeface="Arial"/>
               </a:rPr>
               <a:t>Fifth Outline Level</a:t>
             </a:r>
-            <a:endParaRPr b="0" lang="en-US" sz="2000" spc="-1" strike="noStrike">
-              <a:latin typeface="Arial"/>
-            </a:endParaRPr>
-          </a:p>
-          <a:p>
-            <a:pPr lvl="5" marL="2592000" indent="-216000">
+            <a:endParaRPr b="0" lang="en-US" sz="1800" spc="-1" strike="noStrike">
+              <a:latin typeface="Arial"/>
+            </a:endParaRPr>
+          </a:p>
+          <a:p>
+            <a:pPr lvl="5" marL="2592000" indent="-216000" algn="ctr">
               <a:spcBef>
                 <a:spcPts val="283"/>
               </a:spcBef>
@@ -4313,17 +4313,17 @@
               <a:buChar char=""/>
             </a:pPr>
             <a:r>
-              <a:rPr b="0" lang="en-US" sz="2000" spc="-1" strike="noStrike">
+              <a:rPr b="0" lang="en-US" sz="1800" spc="-1" strike="noStrike">
                 <a:latin typeface="Arial"/>
               </a:rPr>
               <a:t>Sixth Outline Level</a:t>
             </a:r>
-            <a:endParaRPr b="0" lang="en-US" sz="2000" spc="-1" strike="noStrike">
-              <a:latin typeface="Arial"/>
-            </a:endParaRPr>
-          </a:p>
-          <a:p>
-            <a:pPr lvl="6" marL="3024000" indent="-216000">
+            <a:endParaRPr b="0" lang="en-US" sz="1800" spc="-1" strike="noStrike">
+              <a:latin typeface="Arial"/>
+            </a:endParaRPr>
+          </a:p>
+          <a:p>
+            <a:pPr lvl="6" marL="3024000" indent="-216000" algn="ctr">
               <a:spcBef>
                 <a:spcPts val="283"/>
               </a:spcBef>
@@ -4335,12 +4335,12 @@
               <a:buChar char=""/>
             </a:pPr>
             <a:r>
-              <a:rPr b="0" lang="en-US" sz="2000" spc="-1" strike="noStrike">
+              <a:rPr b="0" lang="en-US" sz="1800" spc="-1" strike="noStrike">
                 <a:latin typeface="Arial"/>
               </a:rPr>
               <a:t>Seventh Outline Level</a:t>
             </a:r>
-            <a:endParaRPr b="0" lang="en-US" sz="2000" spc="-1" strike="noStrike">
+            <a:endParaRPr b="0" lang="en-US" sz="1800" spc="-1" strike="noStrike">
               <a:latin typeface="Arial"/>
             </a:endParaRPr>
           </a:p>
@@ -4912,7 +4912,7 @@
         <p:spPr>
           <a:xfrm>
             <a:off x="240840" y="2308320"/>
-            <a:ext cx="12256560" cy="5546520"/>
+            <a:ext cx="12256200" cy="5546160"/>
           </a:xfrm>
           <a:prstGeom prst="rect">
             <a:avLst/>
@@ -5043,7 +5043,7 @@
             </a:endParaRPr>
           </a:p>
           <a:p>
-            <a:pPr marL="736560" indent="-226800">
+            <a:pPr marL="736560" indent="-226440">
               <a:lnSpc>
                 <a:spcPct val="100000"/>
               </a:lnSpc>
@@ -5081,7 +5081,7 @@
             </a:endParaRPr>
           </a:p>
           <a:p>
-            <a:pPr marL="736560" indent="-226800">
+            <a:pPr marL="736560" indent="-226440">
               <a:lnSpc>
                 <a:spcPct val="100000"/>
               </a:lnSpc>
@@ -5119,7 +5119,7 @@
             </a:endParaRPr>
           </a:p>
           <a:p>
-            <a:pPr marL="736560" indent="-226800">
+            <a:pPr marL="736560" indent="-226440">
               <a:lnSpc>
                 <a:spcPct val="100000"/>
               </a:lnSpc>
@@ -5197,7 +5197,7 @@
         <p:spPr>
           <a:xfrm>
             <a:off x="952560" y="444600"/>
-            <a:ext cx="11098080" cy="2157120"/>
+            <a:ext cx="11097720" cy="2156760"/>
           </a:xfrm>
           <a:prstGeom prst="rect">
             <a:avLst/>
@@ -5270,7 +5270,7 @@
         <p:spPr>
           <a:xfrm>
             <a:off x="864000" y="3217680"/>
-            <a:ext cx="11098080" cy="6284880"/>
+            <a:ext cx="11097720" cy="6284520"/>
           </a:xfrm>
           <a:prstGeom prst="rect">
             <a:avLst/>
@@ -5304,7 +5304,7 @@
             </a:endParaRPr>
           </a:p>
           <a:p>
-            <a:pPr marL="444600" indent="-442800">
+            <a:pPr marL="444600" indent="-442440">
               <a:lnSpc>
                 <a:spcPct val="100000"/>
               </a:lnSpc>
@@ -5352,7 +5352,7 @@
             </a:endParaRPr>
           </a:p>
           <a:p>
-            <a:pPr marL="444600" indent="-442800">
+            <a:pPr marL="444600" indent="-442440">
               <a:lnSpc>
                 <a:spcPct val="100000"/>
               </a:lnSpc>
@@ -5377,7 +5377,7 @@
             </a:endParaRPr>
           </a:p>
           <a:p>
-            <a:pPr marL="444600" indent="-442800">
+            <a:pPr marL="444600" indent="-442440">
               <a:lnSpc>
                 <a:spcPct val="100000"/>
               </a:lnSpc>
@@ -5485,7 +5485,7 @@
         <p:spPr>
           <a:xfrm>
             <a:off x="936000" y="3794760"/>
-            <a:ext cx="11098080" cy="2468880"/>
+            <a:ext cx="11097720" cy="2468520"/>
           </a:xfrm>
           <a:prstGeom prst="rect">
             <a:avLst/>
@@ -5511,7 +5511,7 @@
         <p:spPr>
           <a:xfrm>
             <a:off x="212040" y="2835360"/>
-            <a:ext cx="12578760" cy="2271600"/>
+            <a:ext cx="12578400" cy="2271240"/>
           </a:xfrm>
           <a:prstGeom prst="rect">
             <a:avLst/>
@@ -5532,7 +5532,7 @@
             <a:noAutofit/>
           </a:bodyPr>
           <a:p>
-            <a:pPr marL="444600" indent="-442800">
+            <a:pPr marL="444600" indent="-442440">
               <a:lnSpc>
                 <a:spcPct val="100000"/>
               </a:lnSpc>
@@ -5567,7 +5567,7 @@
         <p:spPr>
           <a:xfrm>
             <a:off x="952560" y="444600"/>
-            <a:ext cx="11098080" cy="2157120"/>
+            <a:ext cx="11097720" cy="2156760"/>
           </a:xfrm>
           <a:prstGeom prst="rect">
             <a:avLst/>
@@ -5644,7 +5644,7 @@
         <p:spPr>
           <a:xfrm>
             <a:off x="4312080" y="5256000"/>
-            <a:ext cx="6919560" cy="3846600"/>
+            <a:ext cx="6919200" cy="3846240"/>
           </a:xfrm>
           <a:prstGeom prst="rect">
             <a:avLst/>
@@ -5663,7 +5663,7 @@
         <p:spPr>
           <a:xfrm>
             <a:off x="2102760" y="4297680"/>
-            <a:ext cx="2377800" cy="3045960"/>
+            <a:ext cx="2377440" cy="3045600"/>
           </a:xfrm>
           <a:custGeom>
             <a:avLst/>
@@ -5706,7 +5706,7 @@
         <p:spPr>
           <a:xfrm>
             <a:off x="3960000" y="4248000"/>
-            <a:ext cx="2159640" cy="2591640"/>
+            <a:ext cx="2159280" cy="2591280"/>
           </a:xfrm>
           <a:custGeom>
             <a:avLst/>
@@ -5779,7 +5779,7 @@
         <p:spPr>
           <a:xfrm>
             <a:off x="1357560" y="3794760"/>
-            <a:ext cx="11098080" cy="2468880"/>
+            <a:ext cx="11097720" cy="2468520"/>
           </a:xfrm>
           <a:prstGeom prst="rect">
             <a:avLst/>
@@ -5805,7 +5805,7 @@
         <p:spPr>
           <a:xfrm>
             <a:off x="212040" y="2835360"/>
-            <a:ext cx="12578760" cy="2271600"/>
+            <a:ext cx="12578400" cy="2271240"/>
           </a:xfrm>
           <a:prstGeom prst="rect">
             <a:avLst/>
@@ -5826,7 +5826,7 @@
             <a:noAutofit/>
           </a:bodyPr>
           <a:p>
-            <a:pPr marL="444600" indent="-442800">
+            <a:pPr marL="444600" indent="-442440">
               <a:lnSpc>
                 <a:spcPct val="100000"/>
               </a:lnSpc>
@@ -5871,7 +5871,7 @@
         <p:spPr>
           <a:xfrm>
             <a:off x="952560" y="444600"/>
-            <a:ext cx="11098080" cy="2157120"/>
+            <a:ext cx="11097720" cy="2156760"/>
           </a:xfrm>
           <a:prstGeom prst="rect">
             <a:avLst/>
@@ -5948,7 +5948,7 @@
         <p:spPr>
           <a:xfrm>
             <a:off x="5544000" y="4855680"/>
-            <a:ext cx="6047640" cy="4791960"/>
+            <a:ext cx="6047280" cy="4791600"/>
           </a:xfrm>
           <a:prstGeom prst="rect">
             <a:avLst/>
@@ -5967,7 +5967,7 @@
         <p:spPr>
           <a:xfrm flipH="1">
             <a:off x="5831280" y="3960000"/>
-            <a:ext cx="143640" cy="1583640"/>
+            <a:ext cx="143280" cy="1583280"/>
           </a:xfrm>
           <a:custGeom>
             <a:avLst/>
@@ -6010,7 +6010,7 @@
         <p:spPr>
           <a:xfrm>
             <a:off x="2160000" y="4608000"/>
-            <a:ext cx="6263640" cy="2879640"/>
+            <a:ext cx="6263280" cy="2879280"/>
           </a:xfrm>
           <a:custGeom>
             <a:avLst/>
@@ -6083,7 +6083,7 @@
         <p:spPr>
           <a:xfrm>
             <a:off x="1357560" y="3794760"/>
-            <a:ext cx="11098080" cy="2468880"/>
+            <a:ext cx="11097720" cy="2468520"/>
           </a:xfrm>
           <a:prstGeom prst="rect">
             <a:avLst/>
@@ -6109,7 +6109,7 @@
         <p:spPr>
           <a:xfrm>
             <a:off x="212040" y="2835360"/>
-            <a:ext cx="12578760" cy="2271600"/>
+            <a:ext cx="12578400" cy="2271240"/>
           </a:xfrm>
           <a:prstGeom prst="rect">
             <a:avLst/>
@@ -6130,7 +6130,7 @@
             <a:noAutofit/>
           </a:bodyPr>
           <a:p>
-            <a:pPr marL="444600" indent="-442800">
+            <a:pPr marL="444600" indent="-442440">
               <a:lnSpc>
                 <a:spcPct val="100000"/>
               </a:lnSpc>
@@ -6165,7 +6165,7 @@
         <p:spPr>
           <a:xfrm>
             <a:off x="952560" y="444600"/>
-            <a:ext cx="11098080" cy="2157120"/>
+            <a:ext cx="11097720" cy="2156760"/>
           </a:xfrm>
           <a:prstGeom prst="rect">
             <a:avLst/>
@@ -6242,7 +6242,7 @@
         <p:spPr>
           <a:xfrm>
             <a:off x="5544000" y="4855680"/>
-            <a:ext cx="6047640" cy="4791960"/>
+            <a:ext cx="6047280" cy="4791600"/>
           </a:xfrm>
           <a:prstGeom prst="rect">
             <a:avLst/>
@@ -6261,7 +6261,7 @@
         <p:spPr>
           <a:xfrm>
             <a:off x="3200400" y="4937760"/>
-            <a:ext cx="2919240" cy="1901880"/>
+            <a:ext cx="2918880" cy="1901520"/>
           </a:xfrm>
           <a:custGeom>
             <a:avLst/>
@@ -6334,7 +6334,7 @@
         <p:spPr>
           <a:xfrm>
             <a:off x="1357560" y="3794760"/>
-            <a:ext cx="11098080" cy="2468880"/>
+            <a:ext cx="11097720" cy="2468520"/>
           </a:xfrm>
           <a:prstGeom prst="rect">
             <a:avLst/>
@@ -6360,7 +6360,7 @@
         <p:spPr>
           <a:xfrm>
             <a:off x="212040" y="2835360"/>
-            <a:ext cx="12578760" cy="2271600"/>
+            <a:ext cx="12578400" cy="2271240"/>
           </a:xfrm>
           <a:prstGeom prst="rect">
             <a:avLst/>
@@ -6381,7 +6381,7 @@
             <a:noAutofit/>
           </a:bodyPr>
           <a:p>
-            <a:pPr marL="444600" indent="-442800">
+            <a:pPr marL="444600" indent="-442440">
               <a:lnSpc>
                 <a:spcPct val="100000"/>
               </a:lnSpc>
@@ -6416,7 +6416,7 @@
         <p:spPr>
           <a:xfrm>
             <a:off x="952560" y="444600"/>
-            <a:ext cx="11098080" cy="2157120"/>
+            <a:ext cx="11097720" cy="2156760"/>
           </a:xfrm>
           <a:prstGeom prst="rect">
             <a:avLst/>
@@ -6493,7 +6493,7 @@
         <p:spPr>
           <a:xfrm>
             <a:off x="5544000" y="4855680"/>
-            <a:ext cx="6047640" cy="4791960"/>
+            <a:ext cx="6047280" cy="4791600"/>
           </a:xfrm>
           <a:prstGeom prst="rect">
             <a:avLst/>
@@ -6512,7 +6512,7 @@
         <p:spPr>
           <a:xfrm>
             <a:off x="2925720" y="4572000"/>
-            <a:ext cx="2652120" cy="2123640"/>
+            <a:ext cx="2651760" cy="2123280"/>
           </a:xfrm>
           <a:custGeom>
             <a:avLst/>
@@ -6589,7 +6589,7 @@
         <p:spPr>
           <a:xfrm>
             <a:off x="4896000" y="5602320"/>
-            <a:ext cx="5419080" cy="3685320"/>
+            <a:ext cx="5418720" cy="3684960"/>
           </a:xfrm>
           <a:prstGeom prst="rect">
             <a:avLst/>
@@ -6608,7 +6608,7 @@
         <p:spPr>
           <a:xfrm>
             <a:off x="1357560" y="3794760"/>
-            <a:ext cx="11098080" cy="2468880"/>
+            <a:ext cx="11097720" cy="2468520"/>
           </a:xfrm>
           <a:prstGeom prst="rect">
             <a:avLst/>
@@ -6634,7 +6634,7 @@
         <p:spPr>
           <a:xfrm>
             <a:off x="212040" y="2835360"/>
-            <a:ext cx="12578760" cy="2271600"/>
+            <a:ext cx="12578400" cy="2271240"/>
           </a:xfrm>
           <a:prstGeom prst="rect">
             <a:avLst/>
@@ -6655,7 +6655,7 @@
             <a:noAutofit/>
           </a:bodyPr>
           <a:p>
-            <a:pPr marL="444600" indent="-442800">
+            <a:pPr marL="444600" indent="-442440">
               <a:lnSpc>
                 <a:spcPct val="100000"/>
               </a:lnSpc>
@@ -6690,7 +6690,7 @@
         <p:spPr>
           <a:xfrm>
             <a:off x="952560" y="444600"/>
-            <a:ext cx="11098080" cy="2157120"/>
+            <a:ext cx="11097720" cy="2156760"/>
           </a:xfrm>
           <a:prstGeom prst="rect">
             <a:avLst/>
@@ -6763,7 +6763,7 @@
         <p:spPr>
           <a:xfrm>
             <a:off x="3240000" y="4536000"/>
-            <a:ext cx="3095640" cy="2015640"/>
+            <a:ext cx="3095280" cy="2015280"/>
           </a:xfrm>
           <a:custGeom>
             <a:avLst/>
@@ -6836,7 +6836,7 @@
         <p:spPr>
           <a:xfrm>
             <a:off x="144000" y="2835360"/>
-            <a:ext cx="12646800" cy="6667560"/>
+            <a:ext cx="12646440" cy="6667200"/>
           </a:xfrm>
           <a:prstGeom prst="rect">
             <a:avLst/>
@@ -6857,7 +6857,7 @@
             <a:noAutofit/>
           </a:bodyPr>
           <a:p>
-            <a:pPr marL="444600" indent="-442800">
+            <a:pPr marL="444600" indent="-442440">
               <a:lnSpc>
                 <a:spcPct val="100000"/>
               </a:lnSpc>
@@ -6882,7 +6882,7 @@
             </a:endParaRPr>
           </a:p>
           <a:p>
-            <a:pPr lvl="3" marL="864000" indent="-214920">
+            <a:pPr lvl="3" marL="864000" indent="-214560">
               <a:lnSpc>
                 <a:spcPct val="100000"/>
               </a:lnSpc>
@@ -6929,7 +6929,7 @@
             </a:endParaRPr>
           </a:p>
           <a:p>
-            <a:pPr lvl="3" marL="864000" indent="-214920">
+            <a:pPr lvl="3" marL="864000" indent="-214560">
               <a:lnSpc>
                 <a:spcPct val="100000"/>
               </a:lnSpc>
@@ -6955,7 +6955,7 @@
             </a:endParaRPr>
           </a:p>
           <a:p>
-            <a:pPr lvl="3" marL="864000" indent="-214920">
+            <a:pPr lvl="3" marL="864000" indent="-214560">
               <a:lnSpc>
                 <a:spcPct val="100000"/>
               </a:lnSpc>
@@ -7002,7 +7002,7 @@
             </a:endParaRPr>
           </a:p>
           <a:p>
-            <a:pPr lvl="3" marL="864000" indent="-214920">
+            <a:pPr lvl="3" marL="864000" indent="-214560">
               <a:lnSpc>
                 <a:spcPct val="100000"/>
               </a:lnSpc>
@@ -7038,7 +7038,7 @@
         <p:spPr>
           <a:xfrm>
             <a:off x="952560" y="444600"/>
-            <a:ext cx="11098080" cy="2157120"/>
+            <a:ext cx="11097720" cy="2156760"/>
           </a:xfrm>
           <a:prstGeom prst="rect">
             <a:avLst/>
@@ -7141,7 +7141,7 @@
         <p:spPr>
           <a:xfrm>
             <a:off x="96120" y="3384000"/>
-            <a:ext cx="12646800" cy="5011560"/>
+            <a:ext cx="12646440" cy="5011200"/>
           </a:xfrm>
           <a:prstGeom prst="rect">
             <a:avLst/>
@@ -7162,7 +7162,7 @@
             <a:noAutofit/>
           </a:bodyPr>
           <a:p>
-            <a:pPr marL="444600" indent="-442800">
+            <a:pPr marL="444600" indent="-442440">
               <a:lnSpc>
                 <a:spcPct val="100000"/>
               </a:lnSpc>
@@ -7187,7 +7187,7 @@
             </a:endParaRPr>
           </a:p>
           <a:p>
-            <a:pPr lvl="3" marL="864000" indent="-214920">
+            <a:pPr lvl="3" marL="864000" indent="-214560">
               <a:lnSpc>
                 <a:spcPct val="100000"/>
               </a:lnSpc>
@@ -7213,7 +7213,7 @@
             </a:endParaRPr>
           </a:p>
           <a:p>
-            <a:pPr lvl="3" marL="864000" indent="-214920">
+            <a:pPr lvl="3" marL="864000" indent="-214560">
               <a:lnSpc>
                 <a:spcPct val="100000"/>
               </a:lnSpc>
@@ -7281,7 +7281,7 @@
             </a:endParaRPr>
           </a:p>
           <a:p>
-            <a:pPr lvl="3" marL="864000" indent="-214920">
+            <a:pPr lvl="3" marL="864000" indent="-214560">
               <a:lnSpc>
                 <a:spcPct val="100000"/>
               </a:lnSpc>
@@ -7317,7 +7317,7 @@
         <p:spPr>
           <a:xfrm>
             <a:off x="952560" y="444600"/>
-            <a:ext cx="11098080" cy="2157120"/>
+            <a:ext cx="11097720" cy="2156760"/>
           </a:xfrm>
           <a:prstGeom prst="rect">
             <a:avLst/>
@@ -7424,7 +7424,7 @@
         <p:spPr>
           <a:xfrm>
             <a:off x="4752000" y="5616000"/>
-            <a:ext cx="5419080" cy="3685320"/>
+            <a:ext cx="5418720" cy="3684960"/>
           </a:xfrm>
           <a:prstGeom prst="rect">
             <a:avLst/>
@@ -7443,7 +7443,7 @@
         <p:spPr>
           <a:xfrm>
             <a:off x="212040" y="2632320"/>
-            <a:ext cx="12578760" cy="3897000"/>
+            <a:ext cx="12578400" cy="3896640"/>
           </a:xfrm>
           <a:prstGeom prst="rect">
             <a:avLst/>
@@ -7464,7 +7464,7 @@
             <a:noAutofit/>
           </a:bodyPr>
           <a:p>
-            <a:pPr marL="444600" indent="-442800">
+            <a:pPr marL="444600" indent="-442440">
               <a:lnSpc>
                 <a:spcPct val="100000"/>
               </a:lnSpc>
@@ -7499,7 +7499,7 @@
             </a:endParaRPr>
           </a:p>
           <a:p>
-            <a:pPr marL="444600" indent="-442800">
+            <a:pPr marL="444600" indent="-442440">
               <a:lnSpc>
                 <a:spcPct val="100000"/>
               </a:lnSpc>
@@ -7555,7 +7555,7 @@
         <p:spPr>
           <a:xfrm flipH="1">
             <a:off x="6119280" y="4248000"/>
-            <a:ext cx="4247640" cy="4463640"/>
+            <a:ext cx="4247280" cy="4463280"/>
           </a:xfrm>
           <a:custGeom>
             <a:avLst/>
@@ -7598,7 +7598,7 @@
         <p:spPr>
           <a:xfrm>
             <a:off x="952560" y="444600"/>
-            <a:ext cx="11098080" cy="2157120"/>
+            <a:ext cx="11097720" cy="2156760"/>
           </a:xfrm>
           <a:prstGeom prst="rect">
             <a:avLst/>
@@ -7701,7 +7701,7 @@
         <p:spPr>
           <a:xfrm>
             <a:off x="952560" y="444600"/>
-            <a:ext cx="11098080" cy="2157120"/>
+            <a:ext cx="11097720" cy="2156760"/>
           </a:xfrm>
           <a:prstGeom prst="rect">
             <a:avLst/>
@@ -7774,7 +7774,7 @@
         <p:spPr>
           <a:xfrm>
             <a:off x="212040" y="2793600"/>
-            <a:ext cx="12739680" cy="3350880"/>
+            <a:ext cx="12739320" cy="3350520"/>
           </a:xfrm>
           <a:prstGeom prst="rect">
             <a:avLst/>
@@ -7795,7 +7795,7 @@
             <a:noAutofit/>
           </a:bodyPr>
           <a:p>
-            <a:pPr marL="444600" indent="-442800">
+            <a:pPr marL="444600" indent="-442440">
               <a:lnSpc>
                 <a:spcPct val="100000"/>
               </a:lnSpc>
@@ -7820,7 +7820,7 @@
             </a:endParaRPr>
           </a:p>
           <a:p>
-            <a:pPr marL="444600" indent="-442800">
+            <a:pPr marL="444600" indent="-442440">
               <a:lnSpc>
                 <a:spcPct val="100000"/>
               </a:lnSpc>
@@ -7879,7 +7879,7 @@
         <p:spPr>
           <a:xfrm>
             <a:off x="4248000" y="5472000"/>
-            <a:ext cx="7732440" cy="4189680"/>
+            <a:ext cx="7732080" cy="4189320"/>
           </a:xfrm>
           <a:prstGeom prst="rect">
             <a:avLst/>
@@ -7898,7 +7898,7 @@
         <p:spPr>
           <a:xfrm flipH="1">
             <a:off x="7631280" y="5255280"/>
-            <a:ext cx="2087640" cy="2952000"/>
+            <a:ext cx="2087280" cy="2951640"/>
           </a:xfrm>
           <a:custGeom>
             <a:avLst/>
@@ -7971,7 +7971,7 @@
         <p:spPr>
           <a:xfrm>
             <a:off x="952560" y="2603520"/>
-            <a:ext cx="11098080" cy="6284880"/>
+            <a:ext cx="11097720" cy="6284520"/>
           </a:xfrm>
           <a:prstGeom prst="rect">
             <a:avLst/>
@@ -7992,7 +7992,7 @@
             <a:noAutofit/>
           </a:bodyPr>
           <a:p>
-            <a:pPr marL="280080" indent="-278280">
+            <a:pPr marL="280080" indent="-277920">
               <a:lnSpc>
                 <a:spcPct val="100000"/>
               </a:lnSpc>
@@ -8017,7 +8017,7 @@
             </a:endParaRPr>
           </a:p>
           <a:p>
-            <a:pPr marL="280080" indent="-278280">
+            <a:pPr marL="280080" indent="-277920">
               <a:lnSpc>
                 <a:spcPct val="100000"/>
               </a:lnSpc>
@@ -8045,7 +8045,7 @@
             </a:endParaRPr>
           </a:p>
           <a:p>
-            <a:pPr marL="384120" indent="-142200">
+            <a:pPr marL="384120" indent="-141840">
               <a:lnSpc>
                 <a:spcPct val="100000"/>
               </a:lnSpc>
@@ -8083,7 +8083,7 @@
             </a:endParaRPr>
           </a:p>
           <a:p>
-            <a:pPr marL="384120" indent="-142200">
+            <a:pPr marL="384120" indent="-141840">
               <a:lnSpc>
                 <a:spcPct val="100000"/>
               </a:lnSpc>
@@ -8121,7 +8121,7 @@
             </a:endParaRPr>
           </a:p>
           <a:p>
-            <a:pPr marL="384120" indent="-142200">
+            <a:pPr marL="384120" indent="-141840">
               <a:lnSpc>
                 <a:spcPct val="100000"/>
               </a:lnSpc>
@@ -8159,7 +8159,7 @@
             </a:endParaRPr>
           </a:p>
           <a:p>
-            <a:pPr marL="744120" indent="-278280">
+            <a:pPr marL="744120" indent="-277920">
               <a:lnSpc>
                 <a:spcPct val="100000"/>
               </a:lnSpc>
@@ -8187,7 +8187,7 @@
             </a:endParaRPr>
           </a:p>
           <a:p>
-            <a:pPr marL="384120" indent="-142200">
+            <a:pPr marL="384120" indent="-141840">
               <a:lnSpc>
                 <a:spcPct val="100000"/>
               </a:lnSpc>
@@ -8235,7 +8235,7 @@
         <p:spPr>
           <a:xfrm>
             <a:off x="952560" y="444240"/>
-            <a:ext cx="11098080" cy="2157480"/>
+            <a:ext cx="11097720" cy="2157120"/>
           </a:xfrm>
           <a:prstGeom prst="rect">
             <a:avLst/>
@@ -8320,7 +8320,7 @@
         <p:spPr>
           <a:xfrm>
             <a:off x="2088000" y="5832000"/>
-            <a:ext cx="4982040" cy="3599640"/>
+            <a:ext cx="4981680" cy="3599280"/>
           </a:xfrm>
           <a:prstGeom prst="rect">
             <a:avLst/>
@@ -8338,8 +8338,8 @@
         </p:nvSpPr>
         <p:spPr>
           <a:xfrm flipH="1">
-            <a:off x="6492240" y="5029200"/>
-            <a:ext cx="5394960" cy="3931920"/>
+            <a:off x="6491520" y="5029200"/>
+            <a:ext cx="5394600" cy="3931560"/>
           </a:xfrm>
           <a:custGeom>
             <a:avLst/>
@@ -8382,7 +8382,7 @@
         <p:spPr>
           <a:xfrm>
             <a:off x="212040" y="2516040"/>
-            <a:ext cx="12739680" cy="3350880"/>
+            <a:ext cx="12739320" cy="3350520"/>
           </a:xfrm>
           <a:prstGeom prst="rect">
             <a:avLst/>
@@ -8403,7 +8403,7 @@
             <a:noAutofit/>
           </a:bodyPr>
           <a:p>
-            <a:pPr marL="444600" indent="-442800">
+            <a:pPr marL="444600" indent="-442440">
               <a:lnSpc>
                 <a:spcPct val="100000"/>
               </a:lnSpc>
@@ -8441,7 +8441,7 @@
             </a:endParaRPr>
           </a:p>
           <a:p>
-            <a:pPr marL="444600" indent="-442800">
+            <a:pPr marL="444600" indent="-442440">
               <a:lnSpc>
                 <a:spcPct val="100000"/>
               </a:lnSpc>
@@ -8499,7 +8499,7 @@
         <p:spPr>
           <a:xfrm>
             <a:off x="952560" y="444600"/>
-            <a:ext cx="11098080" cy="2157120"/>
+            <a:ext cx="11097720" cy="2156760"/>
           </a:xfrm>
           <a:prstGeom prst="rect">
             <a:avLst/>
@@ -8624,7 +8624,7 @@
         <p:spPr>
           <a:xfrm>
             <a:off x="9117360" y="4176000"/>
-            <a:ext cx="3266280" cy="3913920"/>
+            <a:ext cx="3265920" cy="3913560"/>
           </a:xfrm>
           <a:prstGeom prst="rect">
             <a:avLst/>
@@ -8643,7 +8643,7 @@
         <p:spPr>
           <a:xfrm>
             <a:off x="4392000" y="5472000"/>
-            <a:ext cx="7271640" cy="359640"/>
+            <a:ext cx="7271280" cy="359280"/>
           </a:xfrm>
           <a:custGeom>
             <a:avLst/>
@@ -8686,7 +8686,7 @@
         <p:spPr>
           <a:xfrm>
             <a:off x="372600" y="3321360"/>
-            <a:ext cx="6868080" cy="2919240"/>
+            <a:ext cx="6867720" cy="2918880"/>
           </a:xfrm>
           <a:prstGeom prst="rect">
             <a:avLst/>
@@ -8707,7 +8707,7 @@
             <a:noAutofit/>
           </a:bodyPr>
           <a:p>
-            <a:pPr marL="444600" indent="-442800">
+            <a:pPr marL="444600" indent="-442440">
               <a:lnSpc>
                 <a:spcPct val="100000"/>
               </a:lnSpc>
@@ -8755,7 +8755,7 @@
         <p:spPr>
           <a:xfrm>
             <a:off x="203040" y="6320160"/>
-            <a:ext cx="6868080" cy="1471320"/>
+            <a:ext cx="6867720" cy="1470960"/>
           </a:xfrm>
           <a:prstGeom prst="rect">
             <a:avLst/>
@@ -8776,7 +8776,7 @@
             <a:noAutofit/>
           </a:bodyPr>
           <a:p>
-            <a:pPr marL="444600" indent="-442800">
+            <a:pPr marL="444600" indent="-442440">
               <a:lnSpc>
                 <a:spcPct val="100000"/>
               </a:lnSpc>
@@ -8851,7 +8851,7 @@
         <p:spPr>
           <a:xfrm>
             <a:off x="952560" y="444600"/>
-            <a:ext cx="11098080" cy="2157120"/>
+            <a:ext cx="11097720" cy="2156760"/>
           </a:xfrm>
           <a:prstGeom prst="rect">
             <a:avLst/>
@@ -8972,7 +8972,7 @@
         <p:spPr>
           <a:xfrm>
             <a:off x="272160" y="2764080"/>
-            <a:ext cx="10383480" cy="2995560"/>
+            <a:ext cx="10383120" cy="2995200"/>
           </a:xfrm>
           <a:prstGeom prst="rect">
             <a:avLst/>
@@ -8993,7 +8993,7 @@
             <a:noAutofit/>
           </a:bodyPr>
           <a:p>
-            <a:pPr marL="529200" indent="-527400">
+            <a:pPr marL="529200" indent="-527040">
               <a:lnSpc>
                 <a:spcPct val="100000"/>
               </a:lnSpc>
@@ -9018,7 +9018,7 @@
             </a:endParaRPr>
           </a:p>
           <a:p>
-            <a:pPr marL="529200" indent="-527400">
+            <a:pPr marL="529200" indent="-527040">
               <a:lnSpc>
                 <a:spcPct val="100000"/>
               </a:lnSpc>
@@ -9073,7 +9073,7 @@
         <p:spPr>
           <a:xfrm>
             <a:off x="144000" y="5760000"/>
-            <a:ext cx="6998400" cy="2386080"/>
+            <a:ext cx="6998040" cy="2385720"/>
           </a:xfrm>
           <a:prstGeom prst="rect">
             <a:avLst/>
@@ -9163,8 +9163,8 @@
         </p:nvSpPr>
         <p:spPr>
           <a:xfrm flipH="1" rot="10800000">
-            <a:off x="24973920" y="8174880"/>
-            <a:ext cx="7050600" cy="443880"/>
+            <a:off x="24974280" y="8175240"/>
+            <a:ext cx="7050240" cy="443520"/>
           </a:xfrm>
           <a:custGeom>
             <a:avLst/>
@@ -9206,8 +9206,8 @@
         </p:nvSpPr>
         <p:spPr>
           <a:xfrm flipH="1" rot="10800000">
-            <a:off x="22534560" y="10944000"/>
-            <a:ext cx="6694920" cy="1366920"/>
+            <a:off x="22534920" y="10944360"/>
+            <a:ext cx="6694560" cy="1366560"/>
           </a:xfrm>
           <a:custGeom>
             <a:avLst/>
@@ -9250,7 +9250,7 @@
         <p:spPr>
           <a:xfrm>
             <a:off x="952560" y="444600"/>
-            <a:ext cx="11098080" cy="2157120"/>
+            <a:ext cx="11097720" cy="2156760"/>
           </a:xfrm>
           <a:prstGeom prst="rect">
             <a:avLst/>
@@ -9345,7 +9345,7 @@
         <p:spPr>
           <a:xfrm>
             <a:off x="8541360" y="5010120"/>
-            <a:ext cx="3266280" cy="3913920"/>
+            <a:ext cx="3265920" cy="3913560"/>
           </a:xfrm>
           <a:prstGeom prst="rect">
             <a:avLst/>
@@ -9363,8 +9363,8 @@
         </p:nvSpPr>
         <p:spPr>
           <a:xfrm flipH="1" rot="10800000">
-            <a:off x="6438960" y="5486400"/>
-            <a:ext cx="3527640" cy="1654560"/>
+            <a:off x="6439320" y="5486760"/>
+            <a:ext cx="3527280" cy="1654200"/>
           </a:xfrm>
           <a:custGeom>
             <a:avLst/>
@@ -9437,7 +9437,7 @@
         <p:spPr>
           <a:xfrm>
             <a:off x="386640" y="3001320"/>
-            <a:ext cx="6923880" cy="2462040"/>
+            <a:ext cx="6923520" cy="2461680"/>
           </a:xfrm>
           <a:prstGeom prst="rect">
             <a:avLst/>
@@ -9488,7 +9488,7 @@
         <p:spPr>
           <a:xfrm>
             <a:off x="-420120" y="5256000"/>
-            <a:ext cx="6863760" cy="4390920"/>
+            <a:ext cx="6863400" cy="4390560"/>
           </a:xfrm>
           <a:prstGeom prst="rect">
             <a:avLst/>
@@ -9509,7 +9509,7 @@
             <a:noAutofit/>
           </a:bodyPr>
           <a:p>
-            <a:pPr marL="1005480" indent="-368640">
+            <a:pPr marL="1005480" indent="-368280">
               <a:lnSpc>
                 <a:spcPct val="100000"/>
               </a:lnSpc>
@@ -9544,7 +9544,7 @@
             </a:endParaRPr>
           </a:p>
           <a:p>
-            <a:pPr marL="1005480" indent="-368640">
+            <a:pPr marL="1005480" indent="-368280">
               <a:lnSpc>
                 <a:spcPct val="100000"/>
               </a:lnSpc>
@@ -9589,7 +9589,7 @@
         <p:spPr>
           <a:xfrm>
             <a:off x="952560" y="444600"/>
-            <a:ext cx="11098080" cy="2157120"/>
+            <a:ext cx="11097720" cy="2156760"/>
           </a:xfrm>
           <a:prstGeom prst="rect">
             <a:avLst/>
@@ -9684,7 +9684,7 @@
         <p:spPr>
           <a:xfrm>
             <a:off x="8973360" y="4608000"/>
-            <a:ext cx="3266280" cy="3913920"/>
+            <a:ext cx="3265920" cy="3913560"/>
           </a:xfrm>
           <a:prstGeom prst="rect">
             <a:avLst/>
@@ -9703,7 +9703,7 @@
         <p:spPr>
           <a:xfrm>
             <a:off x="6552000" y="5939640"/>
-            <a:ext cx="2663640" cy="1620000"/>
+            <a:ext cx="2663280" cy="1619640"/>
           </a:xfrm>
           <a:custGeom>
             <a:avLst/>
@@ -9746,7 +9746,7 @@
         <p:spPr>
           <a:xfrm>
             <a:off x="6552000" y="5939640"/>
-            <a:ext cx="2663640" cy="1260000"/>
+            <a:ext cx="2663280" cy="1259640"/>
           </a:xfrm>
           <a:custGeom>
             <a:avLst/>
@@ -9789,7 +9789,7 @@
         <p:spPr>
           <a:xfrm>
             <a:off x="3709080" y="4976640"/>
-            <a:ext cx="5506560" cy="1863000"/>
+            <a:ext cx="5506200" cy="1862640"/>
           </a:xfrm>
           <a:custGeom>
             <a:avLst/>
@@ -9862,7 +9862,7 @@
         <p:spPr>
           <a:xfrm>
             <a:off x="952560" y="1512000"/>
-            <a:ext cx="11098080" cy="8134920"/>
+            <a:ext cx="11097720" cy="8134560"/>
           </a:xfrm>
           <a:prstGeom prst="rect">
             <a:avLst/>
@@ -9883,7 +9883,7 @@
             <a:noAutofit/>
           </a:bodyPr>
           <a:p>
-            <a:pPr marL="280080" indent="-278280">
+            <a:pPr marL="280080" indent="-277920">
               <a:lnSpc>
                 <a:spcPct val="100000"/>
               </a:lnSpc>
@@ -9909,7 +9909,7 @@
             </a:endParaRPr>
           </a:p>
           <a:p>
-            <a:pPr lvl="1" marL="432000" indent="-214920">
+            <a:pPr lvl="1" marL="432000" indent="-214560">
               <a:lnSpc>
                 <a:spcPct val="100000"/>
               </a:lnSpc>
@@ -9935,7 +9935,7 @@
             </a:endParaRPr>
           </a:p>
           <a:p>
-            <a:pPr lvl="1" marL="432000" indent="-214920">
+            <a:pPr lvl="1" marL="432000" indent="-214560">
               <a:lnSpc>
                 <a:spcPct val="100000"/>
               </a:lnSpc>
@@ -9961,7 +9961,7 @@
             </a:endParaRPr>
           </a:p>
           <a:p>
-            <a:pPr lvl="1" marL="432000" indent="-214920">
+            <a:pPr lvl="1" marL="432000" indent="-214560">
               <a:lnSpc>
                 <a:spcPct val="100000"/>
               </a:lnSpc>
@@ -10007,7 +10007,7 @@
             </a:endParaRPr>
           </a:p>
           <a:p>
-            <a:pPr lvl="1" marL="432000" indent="-214920">
+            <a:pPr lvl="1" marL="432000" indent="-214560">
               <a:lnSpc>
                 <a:spcPct val="100000"/>
               </a:lnSpc>
@@ -10043,7 +10043,7 @@
         <p:spPr>
           <a:xfrm>
             <a:off x="952560" y="-23760"/>
-            <a:ext cx="11098080" cy="2157480"/>
+            <a:ext cx="11097720" cy="2157120"/>
           </a:xfrm>
           <a:prstGeom prst="rect">
             <a:avLst/>
@@ -10124,7 +10124,7 @@
         <p:spPr>
           <a:xfrm>
             <a:off x="952560" y="1512000"/>
-            <a:ext cx="11098080" cy="8134920"/>
+            <a:ext cx="11097720" cy="8134560"/>
           </a:xfrm>
           <a:prstGeom prst="rect">
             <a:avLst/>
@@ -10145,7 +10145,7 @@
             <a:noAutofit/>
           </a:bodyPr>
           <a:p>
-            <a:pPr marL="280080" indent="-278280">
+            <a:pPr marL="280080" indent="-277920">
               <a:lnSpc>
                 <a:spcPct val="100000"/>
               </a:lnSpc>
@@ -10171,7 +10171,7 @@
             </a:endParaRPr>
           </a:p>
           <a:p>
-            <a:pPr lvl="1" marL="432000" indent="-214920">
+            <a:pPr lvl="1" marL="432000" indent="-214560">
               <a:lnSpc>
                 <a:spcPct val="100000"/>
               </a:lnSpc>
@@ -10197,7 +10197,7 @@
             </a:endParaRPr>
           </a:p>
           <a:p>
-            <a:pPr lvl="1" marL="432000" indent="-214920">
+            <a:pPr lvl="1" marL="432000" indent="-214560">
               <a:lnSpc>
                 <a:spcPct val="100000"/>
               </a:lnSpc>
@@ -10223,7 +10223,7 @@
             </a:endParaRPr>
           </a:p>
           <a:p>
-            <a:pPr lvl="1" marL="432000" indent="-214920">
+            <a:pPr lvl="1" marL="432000" indent="-214560">
               <a:lnSpc>
                 <a:spcPct val="100000"/>
               </a:lnSpc>
@@ -10260,7 +10260,7 @@
             </a:endParaRPr>
           </a:p>
           <a:p>
-            <a:pPr lvl="1" marL="432000" indent="-214920">
+            <a:pPr lvl="1" marL="432000" indent="-214560">
               <a:lnSpc>
                 <a:spcPct val="100000"/>
               </a:lnSpc>
@@ -10296,7 +10296,7 @@
             </a:endParaRPr>
           </a:p>
           <a:p>
-            <a:pPr marL="280080" indent="-278280">
+            <a:pPr marL="280080" indent="-277920">
               <a:lnSpc>
                 <a:spcPct val="100000"/>
               </a:lnSpc>
@@ -10322,7 +10322,7 @@
             </a:endParaRPr>
           </a:p>
           <a:p>
-            <a:pPr lvl="1" marL="432000" indent="-214920">
+            <a:pPr lvl="1" marL="432000" indent="-214560">
               <a:lnSpc>
                 <a:spcPct val="100000"/>
               </a:lnSpc>
@@ -10358,7 +10358,7 @@
             </a:endParaRPr>
           </a:p>
           <a:p>
-            <a:pPr lvl="1" marL="432000" indent="-214920">
+            <a:pPr lvl="1" marL="432000" indent="-214560">
               <a:lnSpc>
                 <a:spcPct val="100000"/>
               </a:lnSpc>
@@ -10415,7 +10415,7 @@
         <p:spPr>
           <a:xfrm>
             <a:off x="952560" y="-23760"/>
-            <a:ext cx="11098080" cy="2157480"/>
+            <a:ext cx="11097720" cy="2157120"/>
           </a:xfrm>
           <a:prstGeom prst="rect">
             <a:avLst/>
@@ -10496,7 +10496,7 @@
         <p:spPr>
           <a:xfrm>
             <a:off x="952560" y="444600"/>
-            <a:ext cx="11098080" cy="2157120"/>
+            <a:ext cx="11097720" cy="2156760"/>
           </a:xfrm>
           <a:prstGeom prst="rect">
             <a:avLst/>
@@ -10558,7 +10558,7 @@
         <p:spPr>
           <a:xfrm>
             <a:off x="952560" y="2603520"/>
-            <a:ext cx="11098080" cy="6284880"/>
+            <a:ext cx="11097720" cy="6284520"/>
           </a:xfrm>
           <a:prstGeom prst="rect">
             <a:avLst/>
@@ -10579,7 +10579,7 @@
             <a:noAutofit/>
           </a:bodyPr>
           <a:p>
-            <a:pPr marL="382320" indent="-380520">
+            <a:pPr marL="382320" indent="-380160">
               <a:lnSpc>
                 <a:spcPct val="100000"/>
               </a:lnSpc>
@@ -10604,7 +10604,7 @@
             </a:endParaRPr>
           </a:p>
           <a:p>
-            <a:pPr marL="382320" indent="-380520">
+            <a:pPr marL="382320" indent="-380160">
               <a:lnSpc>
                 <a:spcPct val="100000"/>
               </a:lnSpc>
@@ -10632,7 +10632,7 @@
             </a:endParaRPr>
           </a:p>
           <a:p>
-            <a:pPr marL="382320" indent="-380520">
+            <a:pPr marL="382320" indent="-380160">
               <a:lnSpc>
                 <a:spcPct val="100000"/>
               </a:lnSpc>
@@ -10660,7 +10660,7 @@
             </a:endParaRPr>
           </a:p>
           <a:p>
-            <a:pPr marL="928440" indent="-380520">
+            <a:pPr marL="928440" indent="-380160">
               <a:lnSpc>
                 <a:spcPct val="100000"/>
               </a:lnSpc>
@@ -10700,7 +10700,7 @@
             </a:endParaRPr>
           </a:p>
           <a:p>
-            <a:pPr marL="282960" indent="-281160">
+            <a:pPr marL="282960" indent="-280800">
               <a:lnSpc>
                 <a:spcPct val="100000"/>
               </a:lnSpc>
@@ -10768,7 +10768,7 @@
         <p:spPr>
           <a:xfrm>
             <a:off x="1117440" y="488880"/>
-            <a:ext cx="11098080" cy="6284880"/>
+            <a:ext cx="11097720" cy="6284520"/>
           </a:xfrm>
           <a:prstGeom prst="rect">
             <a:avLst/>
@@ -10789,7 +10789,7 @@
             <a:noAutofit/>
           </a:bodyPr>
           <a:p>
-            <a:pPr marL="444600" indent="-442800">
+            <a:pPr marL="444600" indent="-442440">
               <a:lnSpc>
                 <a:spcPct val="100000"/>
               </a:lnSpc>
@@ -10824,7 +10824,7 @@
         <p:spPr>
           <a:xfrm>
             <a:off x="952560" y="444600"/>
-            <a:ext cx="11098080" cy="2157120"/>
+            <a:ext cx="11097720" cy="2156760"/>
           </a:xfrm>
           <a:prstGeom prst="rect">
             <a:avLst/>
@@ -10885,13 +10885,13 @@
         </p:nvPicPr>
         <p:blipFill>
           <a:blip r:embed="rId1"/>
-          <a:srcRect l="47043" t="0" r="0" b="62626"/>
+          <a:srcRect l="47037" t="0" r="0" b="62620"/>
           <a:stretch/>
         </p:blipFill>
         <p:spPr>
           <a:xfrm>
             <a:off x="2353320" y="5514120"/>
-            <a:ext cx="8296200" cy="2810880"/>
+            <a:ext cx="8295840" cy="2810520"/>
           </a:xfrm>
           <a:prstGeom prst="rect">
             <a:avLst/>
@@ -10910,7 +10910,7 @@
         <p:spPr>
           <a:xfrm>
             <a:off x="7305120" y="3590640"/>
-            <a:ext cx="2737800" cy="2402640"/>
+            <a:ext cx="2737440" cy="2402280"/>
           </a:xfrm>
           <a:custGeom>
             <a:avLst/>
@@ -10983,7 +10983,7 @@
         <p:spPr>
           <a:xfrm>
             <a:off x="952560" y="2826000"/>
-            <a:ext cx="11098080" cy="6284880"/>
+            <a:ext cx="11097720" cy="6284520"/>
           </a:xfrm>
           <a:prstGeom prst="rect">
             <a:avLst/>
@@ -11004,7 +11004,7 @@
             <a:noAutofit/>
           </a:bodyPr>
           <a:p>
-            <a:pPr marL="444600" indent="-442800">
+            <a:pPr marL="444600" indent="-442440">
               <a:lnSpc>
                 <a:spcPct val="100000"/>
               </a:lnSpc>
@@ -11029,7 +11029,7 @@
             </a:endParaRPr>
           </a:p>
           <a:p>
-            <a:pPr marL="444600" indent="-442800">
+            <a:pPr marL="444600" indent="-442440">
               <a:lnSpc>
                 <a:spcPct val="100000"/>
               </a:lnSpc>
@@ -11057,7 +11057,7 @@
             </a:endParaRPr>
           </a:p>
           <a:p>
-            <a:pPr marL="444600" indent="-442800">
+            <a:pPr marL="444600" indent="-442440">
               <a:lnSpc>
                 <a:spcPct val="100000"/>
               </a:lnSpc>
@@ -11105,7 +11105,7 @@
         <p:spPr>
           <a:xfrm>
             <a:off x="952560" y="444600"/>
-            <a:ext cx="11098080" cy="2157120"/>
+            <a:ext cx="11097720" cy="2156760"/>
           </a:xfrm>
           <a:prstGeom prst="rect">
             <a:avLst/>
@@ -11197,7 +11197,7 @@
         <p:spPr>
           <a:xfrm>
             <a:off x="952560" y="1396800"/>
-            <a:ext cx="11098080" cy="6284880"/>
+            <a:ext cx="11097720" cy="6284520"/>
           </a:xfrm>
           <a:prstGeom prst="rect">
             <a:avLst/>
@@ -11294,7 +11294,7 @@
         <p:spPr>
           <a:xfrm>
             <a:off x="952560" y="444600"/>
-            <a:ext cx="11098080" cy="2157480"/>
+            <a:ext cx="11097720" cy="2157120"/>
           </a:xfrm>
           <a:prstGeom prst="rect">
             <a:avLst/>
@@ -11370,7 +11370,7 @@
         <p:spPr>
           <a:xfrm>
             <a:off x="9565200" y="2592000"/>
-            <a:ext cx="2818440" cy="4895640"/>
+            <a:ext cx="2818080" cy="4895280"/>
           </a:xfrm>
           <a:prstGeom prst="rect">
             <a:avLst/>
@@ -11388,8 +11388,8 @@
         </p:nvSpPr>
         <p:spPr>
           <a:xfrm flipH="1" rot="10800000">
-            <a:off x="8503920" y="3368520"/>
-            <a:ext cx="2377440" cy="1203480"/>
+            <a:off x="8503560" y="3368880"/>
+            <a:ext cx="2377080" cy="1203120"/>
           </a:xfrm>
           <a:custGeom>
             <a:avLst/>
@@ -11461,8 +11461,8 @@
         </p:nvSpPr>
         <p:spPr>
           <a:xfrm>
-            <a:off x="952560" y="1905840"/>
-            <a:ext cx="11098080" cy="6284880"/>
+            <a:off x="952560" y="2769840"/>
+            <a:ext cx="11097720" cy="6284520"/>
           </a:xfrm>
           <a:prstGeom prst="rect">
             <a:avLst/>
@@ -11552,7 +11552,7 @@
                 <a:latin typeface="Helvetica Neue Light"/>
                 <a:ea typeface="Helvetica Neue Light"/>
               </a:rPr>
-              <a:t>3.2. Click on Save</a:t>
+              <a:t>3.2. In the “ChainId” box, insert:</a:t>
             </a:r>
             <a:endParaRPr b="0" lang="en-US" sz="3600" spc="-1" strike="noStrike">
               <a:latin typeface="Arial"/>
@@ -11568,6 +11568,39 @@
               </a:spcBef>
             </a:pPr>
             <a:r>
+              <a:rPr b="0" lang="en-GB" sz="2400" spc="-1" strike="noStrike">
+                <a:solidFill>
+                  <a:srgbClr val="942192"/>
+                </a:solidFill>
+                <a:latin typeface="Helvetica Neue Light"/>
+                <a:ea typeface="Helvetica Neue Light"/>
+              </a:rPr>
+              <a:t>  </a:t>
+            </a:r>
+            <a:r>
+              <a:rPr b="0" lang="en-GB" sz="2400" spc="-1" strike="noStrike">
+                <a:solidFill>
+                  <a:srgbClr val="942192"/>
+                </a:solidFill>
+                <a:latin typeface="Helvetica Neue Light"/>
+                <a:ea typeface="Helvetica Neue Light"/>
+              </a:rPr>
+              <a:t>13777222009</a:t>
+            </a:r>
+            <a:endParaRPr b="0" lang="en-US" sz="2400" spc="-1" strike="noStrike">
+              <a:latin typeface="Arial"/>
+            </a:endParaRPr>
+          </a:p>
+          <a:p>
+            <a:pPr>
+              <a:lnSpc>
+                <a:spcPct val="100000"/>
+              </a:lnSpc>
+              <a:spcBef>
+                <a:spcPts val="4201"/>
+              </a:spcBef>
+            </a:pPr>
+            <a:r>
               <a:rPr b="0" lang="en-GB" sz="3600" spc="-1" strike="noStrike">
                 <a:solidFill>
                   <a:srgbClr val="000000"/>
@@ -11575,7 +11608,30 @@
                 <a:latin typeface="Helvetica Neue Light"/>
                 <a:ea typeface="Helvetica Neue Light"/>
               </a:rPr>
-              <a:t>3.3. Press X to go to the main page</a:t>
+              <a:t>3.3. Click on Save</a:t>
+            </a:r>
+            <a:endParaRPr b="0" lang="en-US" sz="3600" spc="-1" strike="noStrike">
+              <a:latin typeface="Arial"/>
+            </a:endParaRPr>
+          </a:p>
+          <a:p>
+            <a:pPr>
+              <a:lnSpc>
+                <a:spcPct val="100000"/>
+              </a:lnSpc>
+              <a:spcBef>
+                <a:spcPts val="4201"/>
+              </a:spcBef>
+            </a:pPr>
+            <a:r>
+              <a:rPr b="0" lang="en-GB" sz="3600" spc="-1" strike="noStrike">
+                <a:solidFill>
+                  <a:srgbClr val="000000"/>
+                </a:solidFill>
+                <a:latin typeface="Helvetica Neue Light"/>
+                <a:ea typeface="Helvetica Neue Light"/>
+              </a:rPr>
+              <a:t>3.4. Press X to go to the main page</a:t>
             </a:r>
             <a:endParaRPr b="0" lang="en-US" sz="3600" spc="-1" strike="noStrike">
               <a:latin typeface="Arial"/>
@@ -11592,7 +11648,7 @@
         <p:spPr>
           <a:xfrm>
             <a:off x="952560" y="444600"/>
-            <a:ext cx="11098080" cy="2157120"/>
+            <a:ext cx="11097720" cy="2156760"/>
           </a:xfrm>
           <a:prstGeom prst="rect">
             <a:avLst/>
@@ -11668,7 +11724,7 @@
         <p:spPr>
           <a:xfrm>
             <a:off x="9288000" y="3780000"/>
-            <a:ext cx="3251160" cy="5435640"/>
+            <a:ext cx="3250800" cy="5435280"/>
           </a:xfrm>
           <a:prstGeom prst="rect">
             <a:avLst/>
@@ -11687,7 +11743,7 @@
         <p:spPr>
           <a:xfrm>
             <a:off x="6666840" y="3709080"/>
-            <a:ext cx="2908800" cy="2554560"/>
+            <a:ext cx="2908440" cy="2554200"/>
           </a:xfrm>
           <a:custGeom>
             <a:avLst/>
@@ -11760,7 +11816,7 @@
         <p:spPr>
           <a:xfrm>
             <a:off x="495360" y="5525640"/>
-            <a:ext cx="9943560" cy="3362400"/>
+            <a:ext cx="9943200" cy="3362040"/>
           </a:xfrm>
           <a:prstGeom prst="rect">
             <a:avLst/>
@@ -11781,7 +11837,7 @@
             <a:noAutofit/>
           </a:bodyPr>
           <a:p>
-            <a:pPr marL="444600" indent="-271080">
+            <a:pPr marL="444600" indent="-270720">
               <a:lnSpc>
                 <a:spcPct val="100000"/>
               </a:lnSpc>
@@ -11794,7 +11850,7 @@
             </a:endParaRPr>
           </a:p>
           <a:p>
-            <a:pPr marL="444600" indent="-442800">
+            <a:pPr marL="444600" indent="-442440">
               <a:lnSpc>
                 <a:spcPct val="100000"/>
               </a:lnSpc>
@@ -11825,7 +11881,7 @@
             </a:endParaRPr>
           </a:p>
           <a:p>
-            <a:pPr marL="444600" indent="-442800">
+            <a:pPr marL="444600" indent="-442440">
               <a:lnSpc>
                 <a:spcPct val="100000"/>
               </a:lnSpc>
@@ -11866,7 +11922,7 @@
         <p:spPr>
           <a:xfrm>
             <a:off x="745200" y="3477600"/>
-            <a:ext cx="6571800" cy="1738080"/>
+            <a:ext cx="6571440" cy="1737720"/>
           </a:xfrm>
           <a:prstGeom prst="rect">
             <a:avLst/>
@@ -11887,7 +11943,7 @@
             <a:noAutofit/>
           </a:bodyPr>
           <a:p>
-            <a:pPr marL="444600" indent="-442800">
+            <a:pPr marL="444600" indent="-442440">
               <a:lnSpc>
                 <a:spcPct val="100000"/>
               </a:lnSpc>
@@ -11922,7 +11978,7 @@
         <p:spPr>
           <a:xfrm>
             <a:off x="952560" y="444600"/>
-            <a:ext cx="11098080" cy="2157120"/>
+            <a:ext cx="11097720" cy="2156760"/>
           </a:xfrm>
           <a:prstGeom prst="rect">
             <a:avLst/>
@@ -11988,7 +12044,7 @@
         <p:spPr>
           <a:xfrm>
             <a:off x="9288000" y="360000"/>
-            <a:ext cx="3636720" cy="6170400"/>
+            <a:ext cx="3636360" cy="6170040"/>
           </a:xfrm>
           <a:prstGeom prst="rect">
             <a:avLst/>
@@ -12006,8 +12062,8 @@
         </p:nvSpPr>
         <p:spPr>
           <a:xfrm flipH="1" rot="10800000">
-            <a:off x="29326680" y="21183120"/>
-            <a:ext cx="6195240" cy="4657680"/>
+            <a:off x="29327040" y="21183480"/>
+            <a:ext cx="6194880" cy="4657320"/>
           </a:xfrm>
           <a:custGeom>
             <a:avLst/>
@@ -12080,7 +12136,7 @@
         <p:spPr>
           <a:xfrm>
             <a:off x="952560" y="444600"/>
-            <a:ext cx="11098080" cy="2157120"/>
+            <a:ext cx="11097720" cy="2156760"/>
           </a:xfrm>
           <a:prstGeom prst="rect">
             <a:avLst/>
@@ -12142,7 +12198,7 @@
         <p:spPr>
           <a:xfrm>
             <a:off x="952560" y="2652840"/>
-            <a:ext cx="11098080" cy="6284880"/>
+            <a:ext cx="11097720" cy="6284520"/>
           </a:xfrm>
           <a:prstGeom prst="rect">
             <a:avLst/>
@@ -12163,7 +12219,7 @@
             <a:noAutofit/>
           </a:bodyPr>
           <a:p>
-            <a:pPr marL="444600" indent="-442800">
+            <a:pPr marL="444600" indent="-442440">
               <a:lnSpc>
                 <a:spcPct val="100000"/>
               </a:lnSpc>
@@ -12188,7 +12244,7 @@
             </a:endParaRPr>
           </a:p>
           <a:p>
-            <a:pPr marL="444600" indent="-442800">
+            <a:pPr marL="444600" indent="-442440">
               <a:lnSpc>
                 <a:spcPct val="100000"/>
               </a:lnSpc>
@@ -12216,7 +12272,7 @@
             </a:endParaRPr>
           </a:p>
           <a:p>
-            <a:pPr marL="444600" indent="-442800">
+            <a:pPr marL="444600" indent="-442440">
               <a:lnSpc>
                 <a:spcPct val="100000"/>
               </a:lnSpc>

</xml_diff>